<commit_message>
update ppt with algorithms comparison
</commit_message>
<xml_diff>
--- a/documentation/Reconstituiri istorice.pptx
+++ b/documentation/Reconstituiri istorice.pptx
@@ -11,10 +11,11 @@
     <p:sldId id="260" r:id="rId5"/>
     <p:sldId id="259" r:id="rId6"/>
     <p:sldId id="267" r:id="rId7"/>
-    <p:sldId id="264" r:id="rId8"/>
-    <p:sldId id="261" r:id="rId9"/>
-    <p:sldId id="268" r:id="rId10"/>
-    <p:sldId id="262" r:id="rId11"/>
+    <p:sldId id="269" r:id="rId8"/>
+    <p:sldId id="264" r:id="rId9"/>
+    <p:sldId id="261" r:id="rId10"/>
+    <p:sldId id="268" r:id="rId11"/>
+    <p:sldId id="262" r:id="rId12"/>
   </p:sldIdLst>
   <p:sldSz cx="12192000" cy="6858000"/>
   <p:notesSz cx="6858000" cy="9144000"/>
@@ -291,7 +292,7 @@
             <a:fld id="{87DE6118-2437-4B30-8E3C-4D2BE6020583}" type="datetimeFigureOut">
               <a:rPr lang="en-US" dirty="0"/>
               <a:pPr/>
-              <a:t>12/13/2021</a:t>
+              <a:t>1/9/2022</a:t>
             </a:fld>
             <a:endParaRPr lang="en-US" dirty="0"/>
           </a:p>
@@ -617,7 +618,7 @@
           <a:p>
             <a:fld id="{87DE6118-2437-4B30-8E3C-4D2BE6020583}" type="datetimeFigureOut">
               <a:rPr lang="en-US" dirty="0"/>
-              <a:t>12/13/2021</a:t>
+              <a:t>1/9/2022</a:t>
             </a:fld>
             <a:endParaRPr lang="en-US" dirty="0"/>
           </a:p>
@@ -792,7 +793,7 @@
           <a:p>
             <a:fld id="{87DE6118-2437-4B30-8E3C-4D2BE6020583}" type="datetimeFigureOut">
               <a:rPr lang="en-US" dirty="0"/>
-              <a:t>12/13/2021</a:t>
+              <a:t>1/9/2022</a:t>
             </a:fld>
             <a:endParaRPr lang="en-US" dirty="0"/>
           </a:p>
@@ -957,7 +958,7 @@
           <a:p>
             <a:fld id="{87DE6118-2437-4B30-8E3C-4D2BE6020583}" type="datetimeFigureOut">
               <a:rPr lang="en-US" dirty="0"/>
-              <a:t>12/13/2021</a:t>
+              <a:t>1/9/2022</a:t>
             </a:fld>
             <a:endParaRPr lang="en-US" dirty="0"/>
           </a:p>
@@ -1230,7 +1231,7 @@
             <a:fld id="{87DE6118-2437-4B30-8E3C-4D2BE6020583}" type="datetimeFigureOut">
               <a:rPr lang="en-US" dirty="0"/>
               <a:pPr/>
-              <a:t>12/13/2021</a:t>
+              <a:t>1/9/2022</a:t>
             </a:fld>
             <a:endParaRPr lang="en-US" dirty="0"/>
           </a:p>
@@ -1620,7 +1621,7 @@
           <a:p>
             <a:fld id="{87DE6118-2437-4B30-8E3C-4D2BE6020583}" type="datetimeFigureOut">
               <a:rPr lang="en-US" dirty="0"/>
-              <a:t>12/13/2021</a:t>
+              <a:t>1/9/2022</a:t>
             </a:fld>
             <a:endParaRPr lang="en-US" dirty="0"/>
           </a:p>
@@ -2092,7 +2093,7 @@
           <a:p>
             <a:fld id="{87DE6118-2437-4B30-8E3C-4D2BE6020583}" type="datetimeFigureOut">
               <a:rPr lang="en-US" dirty="0"/>
-              <a:t>12/13/2021</a:t>
+              <a:t>1/9/2022</a:t>
             </a:fld>
             <a:endParaRPr lang="en-US" dirty="0"/>
           </a:p>
@@ -2205,7 +2206,7 @@
           <a:p>
             <a:fld id="{87DE6118-2437-4B30-8E3C-4D2BE6020583}" type="datetimeFigureOut">
               <a:rPr lang="en-US" dirty="0"/>
-              <a:t>12/13/2021</a:t>
+              <a:t>1/9/2022</a:t>
             </a:fld>
             <a:endParaRPr lang="en-US" dirty="0"/>
           </a:p>
@@ -2295,7 +2296,7 @@
           <a:p>
             <a:fld id="{87DE6118-2437-4B30-8E3C-4D2BE6020583}" type="datetimeFigureOut">
               <a:rPr lang="en-US" dirty="0"/>
-              <a:t>12/13/2021</a:t>
+              <a:t>1/9/2022</a:t>
             </a:fld>
             <a:endParaRPr lang="en-US" dirty="0"/>
           </a:p>
@@ -2637,7 +2638,7 @@
             <a:fld id="{87DE6118-2437-4B30-8E3C-4D2BE6020583}" type="datetimeFigureOut">
               <a:rPr lang="en-US" dirty="0"/>
               <a:pPr/>
-              <a:t>12/13/2021</a:t>
+              <a:t>1/9/2022</a:t>
             </a:fld>
             <a:endParaRPr lang="en-US" dirty="0"/>
           </a:p>
@@ -3022,7 +3023,7 @@
             <a:fld id="{87DE6118-2437-4B30-8E3C-4D2BE6020583}" type="datetimeFigureOut">
               <a:rPr lang="en-US" dirty="0"/>
               <a:pPr/>
-              <a:t>12/13/2021</a:t>
+              <a:t>1/9/2022</a:t>
             </a:fld>
             <a:endParaRPr lang="en-US" dirty="0"/>
           </a:p>
@@ -3297,7 +3298,7 @@
             <a:fld id="{87DE6118-2437-4B30-8E3C-4D2BE6020583}" type="datetimeFigureOut">
               <a:rPr lang="en-US" dirty="0"/>
               <a:pPr/>
-              <a:t>12/13/2021</a:t>
+              <a:t>1/9/2022</a:t>
             </a:fld>
             <a:endParaRPr lang="en-US" dirty="0"/>
           </a:p>
@@ -4074,6 +4075,83 @@
             <p:ph type="title"/>
           </p:nvPr>
         </p:nvSpPr>
+        <p:spPr/>
+        <p:txBody>
+          <a:bodyPr/>
+          <a:lstStyle/>
+          <a:p>
+            <a:r>
+              <a:rPr lang="en-US" dirty="0" err="1" smtClean="0"/>
+              <a:t>Concluzii</a:t>
+            </a:r>
+            <a:endParaRPr lang="en-US" dirty="0"/>
+          </a:p>
+        </p:txBody>
+      </p:sp>
+      <p:pic>
+        <p:nvPicPr>
+          <p:cNvPr id="5" name="Picture 4"/>
+          <p:cNvPicPr>
+            <a:picLocks noChangeAspect="1"/>
+          </p:cNvPicPr>
+          <p:nvPr/>
+        </p:nvPicPr>
+        <p:blipFill>
+          <a:blip r:embed="rId2"/>
+          <a:stretch>
+            <a:fillRect/>
+          </a:stretch>
+        </p:blipFill>
+        <p:spPr>
+          <a:xfrm>
+            <a:off x="2617444" y="1428750"/>
+            <a:ext cx="7896225" cy="5286375"/>
+          </a:xfrm>
+          <a:prstGeom prst="rect">
+            <a:avLst/>
+          </a:prstGeom>
+        </p:spPr>
+      </p:pic>
+    </p:spTree>
+    <p:extLst>
+      <p:ext uri="{BB962C8B-B14F-4D97-AF65-F5344CB8AC3E}">
+        <p14:creationId xmlns:p14="http://schemas.microsoft.com/office/powerpoint/2010/main" val="757424239"/>
+      </p:ext>
+    </p:extLst>
+  </p:cSld>
+  <p:clrMapOvr>
+    <a:masterClrMapping/>
+  </p:clrMapOvr>
+</p:sld>
+</file>
+
+<file path=ppt/slides/slide11.xml><?xml version="1.0" encoding="utf-8"?>
+<p:sld xmlns:a="http://schemas.openxmlformats.org/drawingml/2006/main" xmlns:r="http://schemas.openxmlformats.org/officeDocument/2006/relationships" xmlns:p="http://schemas.openxmlformats.org/presentationml/2006/main">
+  <p:cSld>
+    <p:spTree>
+      <p:nvGrpSpPr>
+        <p:cNvPr id="1" name=""/>
+        <p:cNvGrpSpPr/>
+        <p:nvPr/>
+      </p:nvGrpSpPr>
+      <p:grpSpPr>
+        <a:xfrm>
+          <a:off x="0" y="0"/>
+          <a:ext cx="0" cy="0"/>
+          <a:chOff x="0" y="0"/>
+          <a:chExt cx="0" cy="0"/>
+        </a:xfrm>
+      </p:grpSpPr>
+      <p:sp>
+        <p:nvSpPr>
+          <p:cNvPr id="2" name="Title 1"/>
+          <p:cNvSpPr>
+            <a:spLocks noGrp="1"/>
+          </p:cNvSpPr>
+          <p:nvPr>
+            <p:ph type="title"/>
+          </p:nvPr>
+        </p:nvSpPr>
         <p:spPr>
           <a:xfrm>
             <a:off x="1676400" y="2728784"/>
@@ -5301,7 +5379,11 @@
             </a:r>
             <a:r>
               <a:rPr lang="en-US" dirty="0" smtClean="0"/>
-              <a:t> sex ~80% </a:t>
+              <a:t> sex ~</a:t>
+            </a:r>
+            <a:r>
+              <a:rPr lang="en-US" dirty="0" smtClean="0"/>
+              <a:t>85% </a:t>
             </a:r>
             <a:r>
               <a:rPr lang="en-US" dirty="0" err="1" smtClean="0"/>
@@ -5344,7 +5426,19 @@
             </a:r>
             <a:r>
               <a:rPr lang="en-US" dirty="0" smtClean="0"/>
-              <a:t> ~90% </a:t>
+              <a:t> </a:t>
+            </a:r>
+            <a:r>
+              <a:rPr lang="en-US" dirty="0" smtClean="0"/>
+              <a:t>~</a:t>
+            </a:r>
+            <a:r>
+              <a:rPr lang="en-US" dirty="0" smtClean="0"/>
+              <a:t>30</a:t>
+            </a:r>
+            <a:r>
+              <a:rPr lang="en-US" dirty="0" smtClean="0"/>
+              <a:t>% </a:t>
             </a:r>
             <a:r>
               <a:rPr lang="en-US" dirty="0" err="1" smtClean="0"/>
@@ -5598,46 +5692,157 @@
           <a:p>
             <a:r>
               <a:rPr lang="en-US" dirty="0" err="1" smtClean="0"/>
-              <a:t>Articole</a:t>
-            </a:r>
-            <a:r>
-              <a:rPr lang="en-US" dirty="0" smtClean="0"/>
-              <a:t> </a:t>
-            </a:r>
-            <a:r>
-              <a:rPr lang="en-US" dirty="0" err="1" smtClean="0"/>
-              <a:t>stiintifice</a:t>
-            </a:r>
-            <a:endParaRPr lang="en-US" dirty="0"/>
-          </a:p>
-        </p:txBody>
-      </p:sp>
-      <p:sp>
-        <p:nvSpPr>
-          <p:cNvPr id="3" name="Content Placeholder 2"/>
-          <p:cNvSpPr>
-            <a:spLocks noGrp="1"/>
-          </p:cNvSpPr>
-          <p:nvPr>
-            <p:ph idx="1"/>
-          </p:nvPr>
-        </p:nvSpPr>
-        <p:spPr/>
-        <p:txBody>
-          <a:bodyPr/>
+              <a:t>Rezultate</a:t>
+            </a:r>
+            <a:r>
+              <a:rPr lang="en-US" dirty="0" smtClean="0"/>
+              <a:t> </a:t>
+            </a:r>
+            <a:r>
+              <a:rPr lang="en-US" dirty="0" err="1" smtClean="0"/>
+              <a:t>obtinute</a:t>
+            </a:r>
+            <a:endParaRPr lang="en-US" dirty="0"/>
+          </a:p>
+        </p:txBody>
+      </p:sp>
+      <p:pic>
+        <p:nvPicPr>
+          <p:cNvPr id="4" name="Picture 3"/>
+          <p:cNvPicPr>
+            <a:picLocks noChangeAspect="1"/>
+          </p:cNvPicPr>
+          <p:nvPr/>
+        </p:nvPicPr>
+        <p:blipFill>
+          <a:blip r:embed="rId2"/>
+          <a:stretch>
+            <a:fillRect/>
+          </a:stretch>
+        </p:blipFill>
+        <p:spPr>
+          <a:xfrm>
+            <a:off x="1024919" y="1997689"/>
+            <a:ext cx="5147281" cy="2926080"/>
+          </a:xfrm>
+          <a:prstGeom prst="rect">
+            <a:avLst/>
+          </a:prstGeom>
+        </p:spPr>
+      </p:pic>
+      <p:pic>
+        <p:nvPicPr>
+          <p:cNvPr id="5" name="Picture 4"/>
+          <p:cNvPicPr>
+            <a:picLocks noChangeAspect="1"/>
+          </p:cNvPicPr>
+          <p:nvPr/>
+        </p:nvPicPr>
+        <p:blipFill>
+          <a:blip r:embed="rId3"/>
+          <a:stretch>
+            <a:fillRect/>
+          </a:stretch>
+        </p:blipFill>
+        <p:spPr>
+          <a:xfrm>
+            <a:off x="7019567" y="1997689"/>
+            <a:ext cx="4868603" cy="2926080"/>
+          </a:xfrm>
+          <a:prstGeom prst="rect">
+            <a:avLst/>
+          </a:prstGeom>
+        </p:spPr>
+      </p:pic>
+      <p:sp>
+        <p:nvSpPr>
+          <p:cNvPr id="6" name="TextBox 5"/>
+          <p:cNvSpPr txBox="1"/>
+          <p:nvPr/>
+        </p:nvSpPr>
+        <p:spPr>
+          <a:xfrm>
+            <a:off x="1130060" y="5538158"/>
+            <a:ext cx="10665227" cy="369332"/>
+          </a:xfrm>
+          <a:prstGeom prst="rect">
+            <a:avLst/>
+          </a:prstGeom>
+          <a:noFill/>
+        </p:spPr>
+        <p:txBody>
+          <a:bodyPr wrap="none" rtlCol="0">
+            <a:spAutoFit/>
+          </a:bodyPr>
           <a:lstStyle/>
           <a:p>
             <a:r>
               <a:rPr lang="en-US" dirty="0" err="1" smtClean="0"/>
-              <a:t>Pentru</a:t>
-            </a:r>
-            <a:r>
-              <a:rPr lang="en-US" dirty="0" smtClean="0"/>
-              <a:t> </a:t>
-            </a:r>
-            <a:r>
-              <a:rPr lang="en-US" dirty="0" err="1" smtClean="0"/>
-              <a:t>arborii</a:t>
+              <a:t>Astfel</a:t>
+            </a:r>
+            <a:r>
+              <a:rPr lang="en-US" dirty="0" smtClean="0"/>
+              <a:t> se </a:t>
+            </a:r>
+            <a:r>
+              <a:rPr lang="en-US" dirty="0" err="1" smtClean="0"/>
+              <a:t>poate</a:t>
+            </a:r>
+            <a:r>
+              <a:rPr lang="en-US" dirty="0" smtClean="0"/>
+              <a:t> </a:t>
+            </a:r>
+            <a:r>
+              <a:rPr lang="en-US" dirty="0" err="1" smtClean="0"/>
+              <a:t>observa</a:t>
+            </a:r>
+            <a:r>
+              <a:rPr lang="en-US" dirty="0" smtClean="0"/>
+              <a:t> ca </a:t>
+            </a:r>
+            <a:r>
+              <a:rPr lang="en-US" dirty="0" err="1" smtClean="0"/>
+              <a:t>cele</a:t>
+            </a:r>
+            <a:r>
+              <a:rPr lang="en-US" dirty="0" smtClean="0"/>
+              <a:t> </a:t>
+            </a:r>
+            <a:r>
+              <a:rPr lang="en-US" dirty="0" err="1" smtClean="0"/>
+              <a:t>doua</a:t>
+            </a:r>
+            <a:r>
+              <a:rPr lang="en-US" dirty="0" smtClean="0"/>
+              <a:t> </a:t>
+            </a:r>
+            <a:r>
+              <a:rPr lang="en-US" dirty="0" err="1" smtClean="0"/>
+              <a:t>abordari</a:t>
+            </a:r>
+            <a:r>
+              <a:rPr lang="en-US" dirty="0" smtClean="0"/>
+              <a:t> </a:t>
+            </a:r>
+            <a:r>
+              <a:rPr lang="en-US" dirty="0" err="1" smtClean="0"/>
+              <a:t>conduc</a:t>
+            </a:r>
+            <a:r>
+              <a:rPr lang="en-US" dirty="0" smtClean="0"/>
+              <a:t> la </a:t>
+            </a:r>
+            <a:r>
+              <a:rPr lang="en-US" dirty="0" err="1" smtClean="0"/>
+              <a:t>rezultate</a:t>
+            </a:r>
+            <a:r>
+              <a:rPr lang="en-US" dirty="0" smtClean="0"/>
+              <a:t> similar din </a:t>
+            </a:r>
+            <a:r>
+              <a:rPr lang="en-US" dirty="0" err="1" smtClean="0"/>
+              <a:t>punctul</a:t>
             </a:r>
             <a:r>
               <a:rPr lang="en-US" dirty="0" smtClean="0"/>
@@ -5645,164 +5850,19 @@
             </a:r>
             <a:r>
               <a:rPr lang="en-US" dirty="0" err="1" smtClean="0"/>
-              <a:t>decizie</a:t>
-            </a:r>
-            <a:r>
-              <a:rPr lang="en-US" dirty="0" smtClean="0"/>
-              <a:t> a </a:t>
-            </a:r>
-            <a:r>
-              <a:rPr lang="en-US" dirty="0" err="1" smtClean="0"/>
-              <a:t>fost</a:t>
-            </a:r>
-            <a:r>
-              <a:rPr lang="en-US" dirty="0" smtClean="0"/>
-              <a:t> </a:t>
-            </a:r>
-            <a:r>
-              <a:rPr lang="en-US" dirty="0" err="1" smtClean="0"/>
-              <a:t>importanta</a:t>
-            </a:r>
-            <a:r>
-              <a:rPr lang="en-US" dirty="0" smtClean="0"/>
-              <a:t> </a:t>
-            </a:r>
-            <a:r>
-              <a:rPr lang="en-US" dirty="0" err="1" smtClean="0"/>
-              <a:t>lucrarea</a:t>
-            </a:r>
-            <a:r>
-              <a:rPr lang="en-US" dirty="0"/>
-              <a:t> </a:t>
-            </a:r>
-            <a:r>
-              <a:rPr lang="en-US" i="1" dirty="0" smtClean="0"/>
-              <a:t>Sex Identification In Archaeological Remains Using Decision Tree Learning </a:t>
-            </a:r>
-            <a:r>
-              <a:rPr lang="en-US" dirty="0" smtClean="0"/>
-              <a:t>care a </a:t>
-            </a:r>
-            <a:r>
-              <a:rPr lang="en-US" dirty="0" err="1" smtClean="0"/>
-              <a:t>obtinut</a:t>
-            </a:r>
-            <a:r>
-              <a:rPr lang="en-US" dirty="0" smtClean="0"/>
-              <a:t> o </a:t>
-            </a:r>
-            <a:r>
-              <a:rPr lang="en-US" dirty="0" err="1" smtClean="0"/>
-              <a:t>performanta</a:t>
-            </a:r>
-            <a:r>
-              <a:rPr lang="en-US" dirty="0" smtClean="0"/>
-              <a:t> de ~87% </a:t>
-            </a:r>
-            <a:r>
-              <a:rPr lang="en-US" dirty="0" err="1" smtClean="0"/>
-              <a:t>pentru</a:t>
-            </a:r>
-            <a:r>
-              <a:rPr lang="en-US" dirty="0" smtClean="0"/>
-              <a:t> </a:t>
-            </a:r>
-            <a:r>
-              <a:rPr lang="en-US" dirty="0" err="1" smtClean="0"/>
-              <a:t>acuratete</a:t>
+              <a:t>vedere</a:t>
+            </a:r>
+            <a:r>
+              <a:rPr lang="en-US" dirty="0" smtClean="0"/>
+              <a:t> al </a:t>
+            </a:r>
+            <a:r>
+              <a:rPr lang="en-US" dirty="0" err="1" smtClean="0"/>
+              <a:t>acuratetii</a:t>
             </a:r>
             <a:r>
               <a:rPr lang="en-US" dirty="0" smtClean="0"/>
               <a:t>.</a:t>
-            </a:r>
-          </a:p>
-          <a:p>
-            <a:endParaRPr lang="en-US" dirty="0"/>
-          </a:p>
-          <a:p>
-            <a:r>
-              <a:rPr lang="en-US" dirty="0" err="1" smtClean="0"/>
-              <a:t>Pentru</a:t>
-            </a:r>
-            <a:r>
-              <a:rPr lang="en-US" dirty="0" smtClean="0"/>
-              <a:t> </a:t>
-            </a:r>
-            <a:r>
-              <a:rPr lang="en-US" dirty="0" err="1" smtClean="0"/>
-              <a:t>reteaua</a:t>
-            </a:r>
-            <a:r>
-              <a:rPr lang="en-US" dirty="0" smtClean="0"/>
-              <a:t> </a:t>
-            </a:r>
-            <a:r>
-              <a:rPr lang="en-US" dirty="0" err="1" smtClean="0"/>
-              <a:t>neuronala</a:t>
-            </a:r>
-            <a:r>
-              <a:rPr lang="en-US" dirty="0" smtClean="0"/>
-              <a:t> a </a:t>
-            </a:r>
-            <a:r>
-              <a:rPr lang="en-US" dirty="0" err="1" smtClean="0"/>
-              <a:t>fost</a:t>
-            </a:r>
-            <a:r>
-              <a:rPr lang="en-US" dirty="0" smtClean="0"/>
-              <a:t> </a:t>
-            </a:r>
-            <a:r>
-              <a:rPr lang="en-US" dirty="0" err="1" smtClean="0"/>
-              <a:t>importanta</a:t>
-            </a:r>
-            <a:r>
-              <a:rPr lang="en-US" dirty="0" smtClean="0"/>
-              <a:t> </a:t>
-            </a:r>
-            <a:r>
-              <a:rPr lang="en-US" dirty="0" err="1" smtClean="0"/>
-              <a:t>lucrarea</a:t>
-            </a:r>
-            <a:r>
-              <a:rPr lang="en-US" dirty="0"/>
-              <a:t> </a:t>
-            </a:r>
-            <a:r>
-              <a:rPr lang="en-US" i="1" dirty="0"/>
-              <a:t>Determination of Gender from Pelvic Bones and Patella in Forensic Anthropology: A Comparison of Classification </a:t>
-            </a:r>
-            <a:r>
-              <a:rPr lang="en-US" i="1" dirty="0" err="1" smtClean="0"/>
-              <a:t>Techniquees</a:t>
-            </a:r>
-            <a:r>
-              <a:rPr lang="en-US" dirty="0"/>
-              <a:t> </a:t>
-            </a:r>
-            <a:r>
-              <a:rPr lang="en-US" dirty="0" err="1" smtClean="0"/>
-              <a:t>unde</a:t>
-            </a:r>
-            <a:r>
-              <a:rPr lang="en-US" dirty="0" smtClean="0"/>
-              <a:t> s-a </a:t>
-            </a:r>
-            <a:r>
-              <a:rPr lang="en-US" dirty="0" err="1" smtClean="0"/>
-              <a:t>obtinut</a:t>
-            </a:r>
-            <a:r>
-              <a:rPr lang="en-US" dirty="0" smtClean="0"/>
-              <a:t> o </a:t>
-            </a:r>
-            <a:r>
-              <a:rPr lang="en-US" dirty="0" err="1" smtClean="0"/>
-              <a:t>acuratete</a:t>
-            </a:r>
-            <a:r>
-              <a:rPr lang="en-US" dirty="0" smtClean="0"/>
-              <a:t> de ~98%.</a:t>
             </a:r>
             <a:endParaRPr lang="en-US" dirty="0"/>
           </a:p>
@@ -5811,7 +5871,7 @@
     </p:spTree>
     <p:extLst>
       <p:ext uri="{BB962C8B-B14F-4D97-AF65-F5344CB8AC3E}">
-        <p14:creationId xmlns:p14="http://schemas.microsoft.com/office/powerpoint/2010/main" val="4182110770"/>
+        <p14:creationId xmlns:p14="http://schemas.microsoft.com/office/powerpoint/2010/main" val="492913064"/>
       </p:ext>
     </p:extLst>
   </p:cSld>
@@ -5848,20 +5908,218 @@
             <p:ph type="title"/>
           </p:nvPr>
         </p:nvSpPr>
-        <p:spPr>
-          <a:xfrm>
-            <a:off x="1808205" y="2580503"/>
-            <a:ext cx="9601200" cy="1485900"/>
-          </a:xfrm>
-        </p:spPr>
+        <p:spPr/>
         <p:txBody>
           <a:bodyPr/>
           <a:lstStyle/>
           <a:p>
-            <a:pPr algn="ctr"/>
-            <a:r>
-              <a:rPr lang="en-US" dirty="0" smtClean="0"/>
-              <a:t>DEMO</a:t>
+            <a:r>
+              <a:rPr lang="en-US" dirty="0" err="1" smtClean="0"/>
+              <a:t>Articole</a:t>
+            </a:r>
+            <a:r>
+              <a:rPr lang="en-US" dirty="0" smtClean="0"/>
+              <a:t> </a:t>
+            </a:r>
+            <a:r>
+              <a:rPr lang="en-US" dirty="0" err="1" smtClean="0"/>
+              <a:t>stiintifice</a:t>
+            </a:r>
+            <a:endParaRPr lang="en-US" dirty="0"/>
+          </a:p>
+        </p:txBody>
+      </p:sp>
+      <p:sp>
+        <p:nvSpPr>
+          <p:cNvPr id="3" name="Content Placeholder 2"/>
+          <p:cNvSpPr>
+            <a:spLocks noGrp="1"/>
+          </p:cNvSpPr>
+          <p:nvPr>
+            <p:ph idx="1"/>
+          </p:nvPr>
+        </p:nvSpPr>
+        <p:spPr/>
+        <p:txBody>
+          <a:bodyPr/>
+          <a:lstStyle/>
+          <a:p>
+            <a:r>
+              <a:rPr lang="en-US" dirty="0" err="1" smtClean="0"/>
+              <a:t>Pentru</a:t>
+            </a:r>
+            <a:r>
+              <a:rPr lang="en-US" dirty="0" smtClean="0"/>
+              <a:t> </a:t>
+            </a:r>
+            <a:r>
+              <a:rPr lang="en-US" dirty="0" err="1" smtClean="0"/>
+              <a:t>arborii</a:t>
+            </a:r>
+            <a:r>
+              <a:rPr lang="en-US" dirty="0" smtClean="0"/>
+              <a:t> de </a:t>
+            </a:r>
+            <a:r>
+              <a:rPr lang="en-US" dirty="0" err="1" smtClean="0"/>
+              <a:t>decizie</a:t>
+            </a:r>
+            <a:r>
+              <a:rPr lang="en-US" dirty="0" smtClean="0"/>
+              <a:t> a </a:t>
+            </a:r>
+            <a:r>
+              <a:rPr lang="en-US" dirty="0" err="1" smtClean="0"/>
+              <a:t>fost</a:t>
+            </a:r>
+            <a:r>
+              <a:rPr lang="en-US" dirty="0" smtClean="0"/>
+              <a:t> </a:t>
+            </a:r>
+            <a:r>
+              <a:rPr lang="en-US" dirty="0" err="1" smtClean="0"/>
+              <a:t>importanta</a:t>
+            </a:r>
+            <a:r>
+              <a:rPr lang="en-US" dirty="0" smtClean="0"/>
+              <a:t> </a:t>
+            </a:r>
+            <a:r>
+              <a:rPr lang="en-US" dirty="0" err="1" smtClean="0"/>
+              <a:t>lucrarea</a:t>
+            </a:r>
+            <a:r>
+              <a:rPr lang="en-US" dirty="0"/>
+              <a:t> </a:t>
+            </a:r>
+            <a:r>
+              <a:rPr lang="en-US" i="1" dirty="0" smtClean="0"/>
+              <a:t>Sex Identification In Archaeological Remains Using Decision Tree Learning </a:t>
+            </a:r>
+            <a:r>
+              <a:rPr lang="en-US" dirty="0" smtClean="0"/>
+              <a:t>care a </a:t>
+            </a:r>
+            <a:r>
+              <a:rPr lang="en-US" dirty="0" err="1" smtClean="0"/>
+              <a:t>obtinut</a:t>
+            </a:r>
+            <a:r>
+              <a:rPr lang="en-US" dirty="0" smtClean="0"/>
+              <a:t> o </a:t>
+            </a:r>
+            <a:r>
+              <a:rPr lang="en-US" dirty="0" err="1" smtClean="0"/>
+              <a:t>performanta</a:t>
+            </a:r>
+            <a:r>
+              <a:rPr lang="en-US" dirty="0" smtClean="0"/>
+              <a:t> de ~87% </a:t>
+            </a:r>
+            <a:r>
+              <a:rPr lang="en-US" dirty="0" err="1" smtClean="0"/>
+              <a:t>pentru</a:t>
+            </a:r>
+            <a:r>
+              <a:rPr lang="en-US" dirty="0" smtClean="0"/>
+              <a:t> </a:t>
+            </a:r>
+            <a:r>
+              <a:rPr lang="en-US" dirty="0" err="1" smtClean="0"/>
+              <a:t>acuratete</a:t>
+            </a:r>
+            <a:r>
+              <a:rPr lang="en-US" dirty="0" smtClean="0"/>
+              <a:t>.</a:t>
+            </a:r>
+          </a:p>
+          <a:p>
+            <a:endParaRPr lang="en-US" dirty="0"/>
+          </a:p>
+          <a:p>
+            <a:r>
+              <a:rPr lang="en-US" dirty="0" err="1" smtClean="0"/>
+              <a:t>Pentru</a:t>
+            </a:r>
+            <a:r>
+              <a:rPr lang="en-US" dirty="0" smtClean="0"/>
+              <a:t> </a:t>
+            </a:r>
+            <a:r>
+              <a:rPr lang="en-US" dirty="0" err="1" smtClean="0"/>
+              <a:t>reteaua</a:t>
+            </a:r>
+            <a:r>
+              <a:rPr lang="en-US" dirty="0" smtClean="0"/>
+              <a:t> </a:t>
+            </a:r>
+            <a:r>
+              <a:rPr lang="en-US" dirty="0" err="1" smtClean="0"/>
+              <a:t>neuronala</a:t>
+            </a:r>
+            <a:r>
+              <a:rPr lang="en-US" dirty="0" smtClean="0"/>
+              <a:t> a </a:t>
+            </a:r>
+            <a:r>
+              <a:rPr lang="en-US" dirty="0" err="1" smtClean="0"/>
+              <a:t>fost</a:t>
+            </a:r>
+            <a:r>
+              <a:rPr lang="en-US" dirty="0" smtClean="0"/>
+              <a:t> </a:t>
+            </a:r>
+            <a:r>
+              <a:rPr lang="en-US" dirty="0" err="1" smtClean="0"/>
+              <a:t>importanta</a:t>
+            </a:r>
+            <a:r>
+              <a:rPr lang="en-US" dirty="0" smtClean="0"/>
+              <a:t> </a:t>
+            </a:r>
+            <a:r>
+              <a:rPr lang="en-US" dirty="0" err="1" smtClean="0"/>
+              <a:t>lucrarea</a:t>
+            </a:r>
+            <a:r>
+              <a:rPr lang="en-US" dirty="0"/>
+              <a:t> </a:t>
+            </a:r>
+            <a:r>
+              <a:rPr lang="en-US" i="1" dirty="0"/>
+              <a:t>Determination of Gender from Pelvic Bones and Patella in Forensic Anthropology: A Comparison of Classification </a:t>
+            </a:r>
+            <a:r>
+              <a:rPr lang="en-US" i="1" dirty="0" err="1" smtClean="0"/>
+              <a:t>Techniquees</a:t>
+            </a:r>
+            <a:r>
+              <a:rPr lang="en-US" dirty="0"/>
+              <a:t> </a:t>
+            </a:r>
+            <a:r>
+              <a:rPr lang="en-US" dirty="0" err="1" smtClean="0"/>
+              <a:t>unde</a:t>
+            </a:r>
+            <a:r>
+              <a:rPr lang="en-US" dirty="0" smtClean="0"/>
+              <a:t> s-a </a:t>
+            </a:r>
+            <a:r>
+              <a:rPr lang="en-US" dirty="0" err="1" smtClean="0"/>
+              <a:t>obtinut</a:t>
+            </a:r>
+            <a:r>
+              <a:rPr lang="en-US" dirty="0" smtClean="0"/>
+              <a:t> o </a:t>
+            </a:r>
+            <a:r>
+              <a:rPr lang="en-US" dirty="0" err="1" smtClean="0"/>
+              <a:t>acuratete</a:t>
+            </a:r>
+            <a:r>
+              <a:rPr lang="en-US" dirty="0" smtClean="0"/>
+              <a:t> de ~98%.</a:t>
             </a:r>
             <a:endParaRPr lang="en-US" dirty="0"/>
           </a:p>
@@ -5870,7 +6128,7 @@
     </p:spTree>
     <p:extLst>
       <p:ext uri="{BB962C8B-B14F-4D97-AF65-F5344CB8AC3E}">
-        <p14:creationId xmlns:p14="http://schemas.microsoft.com/office/powerpoint/2010/main" val="1164052274"/>
+        <p14:creationId xmlns:p14="http://schemas.microsoft.com/office/powerpoint/2010/main" val="4182110770"/>
       </p:ext>
     </p:extLst>
   </p:cSld>
@@ -5907,47 +6165,29 @@
             <p:ph type="title"/>
           </p:nvPr>
         </p:nvSpPr>
-        <p:spPr/>
+        <p:spPr>
+          <a:xfrm>
+            <a:off x="1808205" y="2580503"/>
+            <a:ext cx="9601200" cy="1485900"/>
+          </a:xfrm>
+        </p:spPr>
         <p:txBody>
           <a:bodyPr/>
           <a:lstStyle/>
           <a:p>
-            <a:r>
-              <a:rPr lang="en-US" dirty="0" err="1" smtClean="0"/>
-              <a:t>Concluzii</a:t>
-            </a:r>
-            <a:endParaRPr lang="en-US" dirty="0"/>
-          </a:p>
-        </p:txBody>
-      </p:sp>
-      <p:pic>
-        <p:nvPicPr>
-          <p:cNvPr id="5" name="Picture 4"/>
-          <p:cNvPicPr>
-            <a:picLocks noChangeAspect="1"/>
-          </p:cNvPicPr>
-          <p:nvPr/>
-        </p:nvPicPr>
-        <p:blipFill>
-          <a:blip r:embed="rId2"/>
-          <a:stretch>
-            <a:fillRect/>
-          </a:stretch>
-        </p:blipFill>
-        <p:spPr>
-          <a:xfrm>
-            <a:off x="2617444" y="1428750"/>
-            <a:ext cx="7896225" cy="5286375"/>
-          </a:xfrm>
-          <a:prstGeom prst="rect">
-            <a:avLst/>
-          </a:prstGeom>
-        </p:spPr>
-      </p:pic>
+            <a:pPr algn="ctr"/>
+            <a:r>
+              <a:rPr lang="en-US" dirty="0" smtClean="0"/>
+              <a:t>DEMO</a:t>
+            </a:r>
+            <a:endParaRPr lang="en-US" dirty="0"/>
+          </a:p>
+        </p:txBody>
+      </p:sp>
     </p:spTree>
     <p:extLst>
       <p:ext uri="{BB962C8B-B14F-4D97-AF65-F5344CB8AC3E}">
-        <p14:creationId xmlns:p14="http://schemas.microsoft.com/office/powerpoint/2010/main" val="757424239"/>
+        <p14:creationId xmlns:p14="http://schemas.microsoft.com/office/powerpoint/2010/main" val="1164052274"/>
       </p:ext>
     </p:extLst>
   </p:cSld>

</xml_diff>